<commit_message>
new spreadsheet and poster
</commit_message>
<xml_diff>
--- a/Presentations/GitVSC_workshop2306.pptx
+++ b/Presentations/GitVSC_workshop2306.pptx
@@ -309,7 +309,7 @@
           <a:p>
             <a:fld id="{846CE7D5-CF57-46EF-B807-FDD0502418D4}" type="datetimeFigureOut">
               <a:rPr lang="en-US" smtClean="0"/>
-              <a:t>4/26/24</a:t>
+              <a:t>10/15/24</a:t>
             </a:fld>
             <a:endParaRPr lang="en-US"/>
           </a:p>
@@ -479,7 +479,7 @@
           <a:p>
             <a:fld id="{846CE7D5-CF57-46EF-B807-FDD0502418D4}" type="datetimeFigureOut">
               <a:rPr lang="en-US" smtClean="0"/>
-              <a:t>4/26/24</a:t>
+              <a:t>10/15/24</a:t>
             </a:fld>
             <a:endParaRPr lang="en-US"/>
           </a:p>
@@ -659,7 +659,7 @@
           <a:p>
             <a:fld id="{846CE7D5-CF57-46EF-B807-FDD0502418D4}" type="datetimeFigureOut">
               <a:rPr lang="en-US" smtClean="0"/>
-              <a:t>4/26/24</a:t>
+              <a:t>10/15/24</a:t>
             </a:fld>
             <a:endParaRPr lang="en-US"/>
           </a:p>
@@ -829,7 +829,7 @@
           <a:p>
             <a:fld id="{846CE7D5-CF57-46EF-B807-FDD0502418D4}" type="datetimeFigureOut">
               <a:rPr lang="en-US" smtClean="0"/>
-              <a:t>4/26/24</a:t>
+              <a:t>10/15/24</a:t>
             </a:fld>
             <a:endParaRPr lang="en-US"/>
           </a:p>
@@ -1097,7 +1097,7 @@
           <a:p>
             <a:fld id="{846CE7D5-CF57-46EF-B807-FDD0502418D4}" type="datetimeFigureOut">
               <a:rPr lang="en-US" smtClean="0"/>
-              <a:t>4/26/24</a:t>
+              <a:t>10/15/24</a:t>
             </a:fld>
             <a:endParaRPr lang="en-US"/>
           </a:p>
@@ -1329,7 +1329,7 @@
           <a:p>
             <a:fld id="{846CE7D5-CF57-46EF-B807-FDD0502418D4}" type="datetimeFigureOut">
               <a:rPr lang="en-US" smtClean="0"/>
-              <a:t>4/26/24</a:t>
+              <a:t>10/15/24</a:t>
             </a:fld>
             <a:endParaRPr lang="en-US"/>
           </a:p>
@@ -1688,7 +1688,7 @@
           <a:p>
             <a:fld id="{846CE7D5-CF57-46EF-B807-FDD0502418D4}" type="datetimeFigureOut">
               <a:rPr lang="en-US" smtClean="0"/>
-              <a:t>4/26/24</a:t>
+              <a:t>10/15/24</a:t>
             </a:fld>
             <a:endParaRPr lang="en-US"/>
           </a:p>
@@ -1829,7 +1829,7 @@
           <a:p>
             <a:fld id="{846CE7D5-CF57-46EF-B807-FDD0502418D4}" type="datetimeFigureOut">
               <a:rPr lang="en-US" smtClean="0"/>
-              <a:t>4/26/24</a:t>
+              <a:t>10/15/24</a:t>
             </a:fld>
             <a:endParaRPr lang="en-US"/>
           </a:p>
@@ -1924,7 +1924,7 @@
           <a:p>
             <a:fld id="{846CE7D5-CF57-46EF-B807-FDD0502418D4}" type="datetimeFigureOut">
               <a:rPr lang="en-US" smtClean="0"/>
-              <a:t>4/26/24</a:t>
+              <a:t>10/15/24</a:t>
             </a:fld>
             <a:endParaRPr lang="en-US"/>
           </a:p>
@@ -2281,7 +2281,7 @@
           <a:p>
             <a:fld id="{846CE7D5-CF57-46EF-B807-FDD0502418D4}" type="datetimeFigureOut">
               <a:rPr lang="en-US" smtClean="0"/>
-              <a:t>4/26/24</a:t>
+              <a:t>10/15/24</a:t>
             </a:fld>
             <a:endParaRPr lang="en-US"/>
           </a:p>
@@ -2638,7 +2638,7 @@
           <a:p>
             <a:fld id="{846CE7D5-CF57-46EF-B807-FDD0502418D4}" type="datetimeFigureOut">
               <a:rPr lang="en-US" smtClean="0"/>
-              <a:t>4/26/24</a:t>
+              <a:t>10/15/24</a:t>
             </a:fld>
             <a:endParaRPr lang="en-US"/>
           </a:p>
@@ -2880,7 +2880,7 @@
           <a:p>
             <a:fld id="{846CE7D5-CF57-46EF-B807-FDD0502418D4}" type="datetimeFigureOut">
               <a:rPr lang="en-US" smtClean="0"/>
-              <a:t>4/26/24</a:t>
+              <a:t>10/15/24</a:t>
             </a:fld>
             <a:endParaRPr lang="en-US"/>
           </a:p>
@@ -12706,26 +12706,6 @@
 </file>
 
 <file path=customXml/item1.xml><?xml version="1.0" encoding="utf-8"?>
-<?mso-contentType ?>
-<FormTemplates xmlns="http://schemas.microsoft.com/sharepoint/v3/contenttype/forms">
-  <Display>DocumentLibraryForm</Display>
-  <Edit>DocumentLibraryForm</Edit>
-  <New>DocumentLibraryForm</New>
-</FormTemplates>
-</file>
-
-<file path=customXml/item2.xml><?xml version="1.0" encoding="utf-8"?>
-<p:properties xmlns:p="http://schemas.microsoft.com/office/2006/metadata/properties" xmlns:xsi="http://www.w3.org/2001/XMLSchema-instance" xmlns:pc="http://schemas.microsoft.com/office/infopath/2007/PartnerControls">
-  <documentManagement>
-    <lcf76f155ced4ddcb4097134ff3c332f xmlns="0c8c195d-e1f6-4270-9ea8-5cda6b8b865a">
-      <Terms xmlns="http://schemas.microsoft.com/office/infopath/2007/PartnerControls"/>
-    </lcf76f155ced4ddcb4097134ff3c332f>
-    <TaxCatchAll xmlns="6045a0df-7b0b-4cbb-bde0-e6502ab27289" xsi:nil="true"/>
-  </documentManagement>
-</p:properties>
-</file>
-
-<file path=customXml/item3.xml><?xml version="1.0" encoding="utf-8"?>
 <ct:contentTypeSchema xmlns:ct="http://schemas.microsoft.com/office/2006/metadata/contentType" xmlns:ma="http://schemas.microsoft.com/office/2006/metadata/properties/metaAttributes" ct:_="" ma:_="" ma:contentTypeName="Document" ma:contentTypeID="0x01010031DC74BF9C959649B3EE9F408B75FDEB" ma:contentTypeVersion="9" ma:contentTypeDescription="Create a new document." ma:contentTypeScope="" ma:versionID="9bd74375aa6741d6ef2c116f964ea249">
   <xsd:schema xmlns:xsd="http://www.w3.org/2001/XMLSchema" xmlns:xs="http://www.w3.org/2001/XMLSchema" xmlns:p="http://schemas.microsoft.com/office/2006/metadata/properties" xmlns:ns2="0c8c195d-e1f6-4270-9ea8-5cda6b8b865a" xmlns:ns3="6045a0df-7b0b-4cbb-bde0-e6502ab27289" targetNamespace="http://schemas.microsoft.com/office/2006/metadata/properties" ma:root="true" ma:fieldsID="b32d0ce8962a72d9bd9ba7601065bd3e" ns2:_="" ns3:_="">
     <xsd:import namespace="0c8c195d-e1f6-4270-9ea8-5cda6b8b865a"/>
@@ -12908,10 +12888,41 @@
 </ct:contentTypeSchema>
 </file>
 
+<file path=customXml/item2.xml><?xml version="1.0" encoding="utf-8"?>
+<p:properties xmlns:p="http://schemas.microsoft.com/office/2006/metadata/properties" xmlns:xsi="http://www.w3.org/2001/XMLSchema-instance" xmlns:pc="http://schemas.microsoft.com/office/infopath/2007/PartnerControls">
+  <documentManagement>
+    <lcf76f155ced4ddcb4097134ff3c332f xmlns="0c8c195d-e1f6-4270-9ea8-5cda6b8b865a">
+      <Terms xmlns="http://schemas.microsoft.com/office/infopath/2007/PartnerControls"/>
+    </lcf76f155ced4ddcb4097134ff3c332f>
+    <TaxCatchAll xmlns="6045a0df-7b0b-4cbb-bde0-e6502ab27289" xsi:nil="true"/>
+  </documentManagement>
+</p:properties>
+</file>
+
+<file path=customXml/item3.xml><?xml version="1.0" encoding="utf-8"?>
+<?mso-contentType ?>
+<FormTemplates xmlns="http://schemas.microsoft.com/sharepoint/v3/contenttype/forms">
+  <Display>DocumentLibraryForm</Display>
+  <Edit>DocumentLibraryForm</Edit>
+  <New>DocumentLibraryForm</New>
+</FormTemplates>
+</file>
+
 <file path=customXml/itemProps1.xml><?xml version="1.0" encoding="utf-8"?>
-<ds:datastoreItem xmlns:ds="http://schemas.openxmlformats.org/officeDocument/2006/customXml" ds:itemID="{E230329C-2C4C-43FB-A70E-1973EF9770C9}">
+<ds:datastoreItem xmlns:ds="http://schemas.openxmlformats.org/officeDocument/2006/customXml" ds:itemID="{2E6AEEF1-F9D0-4735-B53C-AFCCCBFA2483}">
   <ds:schemaRefs>
-    <ds:schemaRef ds:uri="http://schemas.microsoft.com/sharepoint/v3/contenttype/forms"/>
+    <ds:schemaRef ds:uri="http://schemas.microsoft.com/office/2006/metadata/contentType"/>
+    <ds:schemaRef ds:uri="http://schemas.microsoft.com/office/2006/metadata/properties/metaAttributes"/>
+    <ds:schemaRef ds:uri="http://www.w3.org/2001/XMLSchema"/>
+    <ds:schemaRef ds:uri="http://schemas.microsoft.com/office/2006/metadata/properties"/>
+    <ds:schemaRef ds:uri="0c8c195d-e1f6-4270-9ea8-5cda6b8b865a"/>
+    <ds:schemaRef ds:uri="6045a0df-7b0b-4cbb-bde0-e6502ab27289"/>
+    <ds:schemaRef ds:uri="http://schemas.microsoft.com/office/2006/documentManagement/types"/>
+    <ds:schemaRef ds:uri="http://schemas.microsoft.com/office/infopath/2007/PartnerControls"/>
+    <ds:schemaRef ds:uri="http://schemas.openxmlformats.org/package/2006/metadata/core-properties"/>
+    <ds:schemaRef ds:uri="http://purl.org/dc/elements/1.1/"/>
+    <ds:schemaRef ds:uri="http://purl.org/dc/terms/"/>
+    <ds:schemaRef ds:uri="http://schemas.microsoft.com/internal/obd"/>
   </ds:schemaRefs>
 </ds:datastoreItem>
 </file>
@@ -12934,20 +12945,9 @@
 </file>
 
 <file path=customXml/itemProps3.xml><?xml version="1.0" encoding="utf-8"?>
-<ds:datastoreItem xmlns:ds="http://schemas.openxmlformats.org/officeDocument/2006/customXml" ds:itemID="{2E6AEEF1-F9D0-4735-B53C-AFCCCBFA2483}">
+<ds:datastoreItem xmlns:ds="http://schemas.openxmlformats.org/officeDocument/2006/customXml" ds:itemID="{E230329C-2C4C-43FB-A70E-1973EF9770C9}">
   <ds:schemaRefs>
-    <ds:schemaRef ds:uri="http://schemas.microsoft.com/office/2006/metadata/contentType"/>
-    <ds:schemaRef ds:uri="http://schemas.microsoft.com/office/2006/metadata/properties/metaAttributes"/>
-    <ds:schemaRef ds:uri="http://www.w3.org/2001/XMLSchema"/>
-    <ds:schemaRef ds:uri="http://schemas.microsoft.com/office/2006/metadata/properties"/>
-    <ds:schemaRef ds:uri="0c8c195d-e1f6-4270-9ea8-5cda6b8b865a"/>
-    <ds:schemaRef ds:uri="6045a0df-7b0b-4cbb-bde0-e6502ab27289"/>
-    <ds:schemaRef ds:uri="http://schemas.microsoft.com/office/2006/documentManagement/types"/>
-    <ds:schemaRef ds:uri="http://schemas.microsoft.com/office/infopath/2007/PartnerControls"/>
-    <ds:schemaRef ds:uri="http://schemas.openxmlformats.org/package/2006/metadata/core-properties"/>
-    <ds:schemaRef ds:uri="http://purl.org/dc/elements/1.1/"/>
-    <ds:schemaRef ds:uri="http://purl.org/dc/terms/"/>
-    <ds:schemaRef ds:uri="http://schemas.microsoft.com/internal/obd"/>
+    <ds:schemaRef ds:uri="http://schemas.microsoft.com/sharepoint/v3/contenttype/forms"/>
   </ds:schemaRefs>
 </ds:datastoreItem>
 </file>
</xml_diff>